<commit_message>
Actualización Clases 01 y 02
</commit_message>
<xml_diff>
--- a/Clases/[2] Lógica y Control de Flujo.pptx
+++ b/Clases/[2] Lógica y Control de Flujo.pptx
@@ -1243,6 +1243,13 @@
         </dgm:presLayoutVars>
       </dgm:prSet>
       <dgm:spPr/>
+      <dgm:t>
+        <a:bodyPr/>
+        <a:lstStyle/>
+        <a:p>
+          <a:endParaRPr lang="es-ES"/>
+        </a:p>
+      </dgm:t>
     </dgm:pt>
     <dgm:pt modelId="{040B8115-4B76-4BD7-A2B3-C68D3667A132}" type="pres">
       <dgm:prSet presAssocID="{C366E401-F7BD-47FE-90D7-CD004349363D}" presName="parentText" presStyleLbl="node1" presStyleIdx="0" presStyleCnt="4">
@@ -1252,6 +1259,13 @@
         </dgm:presLayoutVars>
       </dgm:prSet>
       <dgm:spPr/>
+      <dgm:t>
+        <a:bodyPr/>
+        <a:lstStyle/>
+        <a:p>
+          <a:endParaRPr lang="es-ES"/>
+        </a:p>
+      </dgm:t>
     </dgm:pt>
     <dgm:pt modelId="{E1627D40-3CF6-42E5-A057-95A870E85542}" type="pres">
       <dgm:prSet presAssocID="{542B0EF0-C5EC-4974-9EF6-C63E349B14CC}" presName="spacer" presStyleCnt="0"/>
@@ -1265,6 +1279,13 @@
         </dgm:presLayoutVars>
       </dgm:prSet>
       <dgm:spPr/>
+      <dgm:t>
+        <a:bodyPr/>
+        <a:lstStyle/>
+        <a:p>
+          <a:endParaRPr lang="es-ES"/>
+        </a:p>
+      </dgm:t>
     </dgm:pt>
     <dgm:pt modelId="{0A5581C9-6E9E-45CA-B251-DCBFDD3FDAEF}" type="pres">
       <dgm:prSet presAssocID="{0F940376-4FB9-49B7-9A8C-45A2BF1F7750}" presName="spacer" presStyleCnt="0"/>
@@ -1278,6 +1299,13 @@
         </dgm:presLayoutVars>
       </dgm:prSet>
       <dgm:spPr/>
+      <dgm:t>
+        <a:bodyPr/>
+        <a:lstStyle/>
+        <a:p>
+          <a:endParaRPr lang="es-ES"/>
+        </a:p>
+      </dgm:t>
     </dgm:pt>
     <dgm:pt modelId="{27FA8A20-CFB5-4C02-BE99-848A72F99F2F}" type="pres">
       <dgm:prSet presAssocID="{2D881FD0-21E8-4316-BA46-201099DD1696}" presName="spacer" presStyleCnt="0"/>
@@ -1291,6 +1319,13 @@
         </dgm:presLayoutVars>
       </dgm:prSet>
       <dgm:spPr/>
+      <dgm:t>
+        <a:bodyPr/>
+        <a:lstStyle/>
+        <a:p>
+          <a:endParaRPr lang="es-ES"/>
+        </a:p>
+      </dgm:t>
     </dgm:pt>
     <dgm:pt modelId="{3B464524-4CF0-46A5-98D5-EC21CB408EC3}" type="pres">
       <dgm:prSet presAssocID="{432F8A22-B261-4408-919F-85C2A6CD6EE5}" presName="childText" presStyleLbl="revTx" presStyleIdx="0" presStyleCnt="1">
@@ -1299,20 +1334,27 @@
         </dgm:presLayoutVars>
       </dgm:prSet>
       <dgm:spPr/>
+      <dgm:t>
+        <a:bodyPr/>
+        <a:lstStyle/>
+        <a:p>
+          <a:endParaRPr lang="es-ES"/>
+        </a:p>
+      </dgm:t>
     </dgm:pt>
   </dgm:ptLst>
   <dgm:cxnLst>
+    <dgm:cxn modelId="{73725B59-B018-412C-98F6-E23A09322FE7}" type="presOf" srcId="{C366E401-F7BD-47FE-90D7-CD004349363D}" destId="{040B8115-4B76-4BD7-A2B3-C68D3667A132}" srcOrd="0" destOrd="0" presId="urn:microsoft.com/office/officeart/2005/8/layout/vList2"/>
+    <dgm:cxn modelId="{CBA465B8-FBDF-4024-ABDC-4011FD4A2E26}" type="presOf" srcId="{AC0F78BA-68B6-41F4-80B3-6A3C6B3CDD8C}" destId="{3B464524-4CF0-46A5-98D5-EC21CB408EC3}" srcOrd="0" destOrd="0" presId="urn:microsoft.com/office/officeart/2005/8/layout/vList2"/>
+    <dgm:cxn modelId="{EF56D213-674B-4CC0-84F8-3DD0595CF434}" srcId="{568381E4-BD4A-4F76-B122-74DD9EDF46A1}" destId="{C366E401-F7BD-47FE-90D7-CD004349363D}" srcOrd="0" destOrd="0" parTransId="{0BF1899A-530A-4752-A5CF-492163F6DBB6}" sibTransId="{542B0EF0-C5EC-4974-9EF6-C63E349B14CC}"/>
+    <dgm:cxn modelId="{E1FC56FC-B96C-40C0-B857-748F36594B77}" type="presOf" srcId="{28923B78-65CE-4E59-80F0-86F4C2530221}" destId="{2441AFBA-8A79-4A76-827D-489CB7924919}" srcOrd="0" destOrd="0" presId="urn:microsoft.com/office/officeart/2005/8/layout/vList2"/>
+    <dgm:cxn modelId="{24B06699-7E31-4F2A-B794-91B1E205DBFB}" type="presOf" srcId="{432F8A22-B261-4408-919F-85C2A6CD6EE5}" destId="{1B50D7D3-F04A-4AE4-8C0A-9372889C5987}" srcOrd="0" destOrd="0" presId="urn:microsoft.com/office/officeart/2005/8/layout/vList2"/>
+    <dgm:cxn modelId="{99CDC5DF-9790-4797-B90F-D7C93EBFF431}" srcId="{568381E4-BD4A-4F76-B122-74DD9EDF46A1}" destId="{432F8A22-B261-4408-919F-85C2A6CD6EE5}" srcOrd="3" destOrd="0" parTransId="{2420FCFD-379A-4738-A03D-D50F4117CFA6}" sibTransId="{DA90A1E6-9F9C-4D7A-840D-3E6F96C5FCA9}"/>
+    <dgm:cxn modelId="{DF92F8DB-29BE-434B-AE56-C6B91BFC0B40}" type="presOf" srcId="{568381E4-BD4A-4F76-B122-74DD9EDF46A1}" destId="{A4092E37-8200-4D24-A498-3AE1F2B18B6F}" srcOrd="0" destOrd="0" presId="urn:microsoft.com/office/officeart/2005/8/layout/vList2"/>
     <dgm:cxn modelId="{42DB7A0B-18DE-4D5F-8588-974A8664AA02}" srcId="{432F8A22-B261-4408-919F-85C2A6CD6EE5}" destId="{AC0F78BA-68B6-41F4-80B3-6A3C6B3CDD8C}" srcOrd="0" destOrd="0" parTransId="{6265CA23-64BF-4C7E-B1F8-DA0D0CCA5D1E}" sibTransId="{200724B2-43E0-44D6-9B7A-A22D9E88A288}"/>
-    <dgm:cxn modelId="{EF56D213-674B-4CC0-84F8-3DD0595CF434}" srcId="{568381E4-BD4A-4F76-B122-74DD9EDF46A1}" destId="{C366E401-F7BD-47FE-90D7-CD004349363D}" srcOrd="0" destOrd="0" parTransId="{0BF1899A-530A-4752-A5CF-492163F6DBB6}" sibTransId="{542B0EF0-C5EC-4974-9EF6-C63E349B14CC}"/>
+    <dgm:cxn modelId="{AB81B04B-22D4-42F1-8D74-AD029BD7878C}" type="presOf" srcId="{B1173742-6E6D-426C-BEA9-ED07942DE110}" destId="{D71E4403-F493-470F-B501-AA99653E8FDB}" srcOrd="0" destOrd="0" presId="urn:microsoft.com/office/officeart/2005/8/layout/vList2"/>
     <dgm:cxn modelId="{BAA3ED67-635C-477A-9B76-D52C7384DB1D}" srcId="{568381E4-BD4A-4F76-B122-74DD9EDF46A1}" destId="{28923B78-65CE-4E59-80F0-86F4C2530221}" srcOrd="1" destOrd="0" parTransId="{143B723C-6E87-4CD1-B61B-B91FE0DF7325}" sibTransId="{0F940376-4FB9-49B7-9A8C-45A2BF1F7750}"/>
-    <dgm:cxn modelId="{AB81B04B-22D4-42F1-8D74-AD029BD7878C}" type="presOf" srcId="{B1173742-6E6D-426C-BEA9-ED07942DE110}" destId="{D71E4403-F493-470F-B501-AA99653E8FDB}" srcOrd="0" destOrd="0" presId="urn:microsoft.com/office/officeart/2005/8/layout/vList2"/>
-    <dgm:cxn modelId="{73725B59-B018-412C-98F6-E23A09322FE7}" type="presOf" srcId="{C366E401-F7BD-47FE-90D7-CD004349363D}" destId="{040B8115-4B76-4BD7-A2B3-C68D3667A132}" srcOrd="0" destOrd="0" presId="urn:microsoft.com/office/officeart/2005/8/layout/vList2"/>
     <dgm:cxn modelId="{CDBDB85A-DE07-4641-A0CE-735FFA54A286}" srcId="{568381E4-BD4A-4F76-B122-74DD9EDF46A1}" destId="{B1173742-6E6D-426C-BEA9-ED07942DE110}" srcOrd="2" destOrd="0" parTransId="{2F4E09C9-299D-48F3-8541-411ED08C30A5}" sibTransId="{2D881FD0-21E8-4316-BA46-201099DD1696}"/>
-    <dgm:cxn modelId="{24B06699-7E31-4F2A-B794-91B1E205DBFB}" type="presOf" srcId="{432F8A22-B261-4408-919F-85C2A6CD6EE5}" destId="{1B50D7D3-F04A-4AE4-8C0A-9372889C5987}" srcOrd="0" destOrd="0" presId="urn:microsoft.com/office/officeart/2005/8/layout/vList2"/>
-    <dgm:cxn modelId="{CBA465B8-FBDF-4024-ABDC-4011FD4A2E26}" type="presOf" srcId="{AC0F78BA-68B6-41F4-80B3-6A3C6B3CDD8C}" destId="{3B464524-4CF0-46A5-98D5-EC21CB408EC3}" srcOrd="0" destOrd="0" presId="urn:microsoft.com/office/officeart/2005/8/layout/vList2"/>
-    <dgm:cxn modelId="{DF92F8DB-29BE-434B-AE56-C6B91BFC0B40}" type="presOf" srcId="{568381E4-BD4A-4F76-B122-74DD9EDF46A1}" destId="{A4092E37-8200-4D24-A498-3AE1F2B18B6F}" srcOrd="0" destOrd="0" presId="urn:microsoft.com/office/officeart/2005/8/layout/vList2"/>
-    <dgm:cxn modelId="{99CDC5DF-9790-4797-B90F-D7C93EBFF431}" srcId="{568381E4-BD4A-4F76-B122-74DD9EDF46A1}" destId="{432F8A22-B261-4408-919F-85C2A6CD6EE5}" srcOrd="3" destOrd="0" parTransId="{2420FCFD-379A-4738-A03D-D50F4117CFA6}" sibTransId="{DA90A1E6-9F9C-4D7A-840D-3E6F96C5FCA9}"/>
-    <dgm:cxn modelId="{E1FC56FC-B96C-40C0-B857-748F36594B77}" type="presOf" srcId="{28923B78-65CE-4E59-80F0-86F4C2530221}" destId="{2441AFBA-8A79-4A76-827D-489CB7924919}" srcOrd="0" destOrd="0" presId="urn:microsoft.com/office/officeart/2005/8/layout/vList2"/>
     <dgm:cxn modelId="{EC016BF9-87CF-4ECD-90AB-11F7699F2B14}" type="presParOf" srcId="{A4092E37-8200-4D24-A498-3AE1F2B18B6F}" destId="{040B8115-4B76-4BD7-A2B3-C68D3667A132}" srcOrd="0" destOrd="0" presId="urn:microsoft.com/office/officeart/2005/8/layout/vList2"/>
     <dgm:cxn modelId="{9EE15522-F6A1-43E3-B7C4-84DA524BE452}" type="presParOf" srcId="{A4092E37-8200-4D24-A498-3AE1F2B18B6F}" destId="{E1627D40-3CF6-42E5-A057-95A870E85542}" srcOrd="1" destOrd="0" presId="urn:microsoft.com/office/officeart/2005/8/layout/vList2"/>
     <dgm:cxn modelId="{2D4485B0-A70B-4AD2-BB3B-E65D64D68E8D}" type="presParOf" srcId="{A4092E37-8200-4D24-A498-3AE1F2B18B6F}" destId="{2441AFBA-8A79-4A76-827D-489CB7924919}" srcOrd="2" destOrd="0" presId="urn:microsoft.com/office/officeart/2005/8/layout/vList2"/>
@@ -1395,7 +1437,7 @@
         </a:bodyPr>
         <a:lstStyle/>
         <a:p>
-          <a:pPr marL="0" lvl="0" indent="0" algn="l" defTabSz="711200">
+          <a:pPr lvl="0" algn="l" defTabSz="711200">
             <a:lnSpc>
               <a:spcPct val="90000"/>
             </a:lnSpc>
@@ -1405,7 +1447,6 @@
             <a:spcAft>
               <a:spcPct val="35000"/>
             </a:spcAft>
-            <a:buNone/>
           </a:pPr>
           <a:r>
             <a:rPr lang="es-MX" sz="1600" kern="1200"/>
@@ -1490,7 +1531,7 @@
         </a:bodyPr>
         <a:lstStyle/>
         <a:p>
-          <a:pPr marL="0" lvl="0" indent="0" algn="l" defTabSz="711200">
+          <a:pPr lvl="0" algn="l" defTabSz="711200">
             <a:lnSpc>
               <a:spcPct val="90000"/>
             </a:lnSpc>
@@ -1500,7 +1541,6 @@
             <a:spcAft>
               <a:spcPct val="35000"/>
             </a:spcAft>
-            <a:buNone/>
           </a:pPr>
           <a:r>
             <a:rPr lang="es-MX" sz="1600" kern="1200"/>
@@ -1585,7 +1625,7 @@
         </a:bodyPr>
         <a:lstStyle/>
         <a:p>
-          <a:pPr marL="0" lvl="0" indent="0" algn="l" defTabSz="711200">
+          <a:pPr lvl="0" algn="l" defTabSz="711200">
             <a:lnSpc>
               <a:spcPct val="90000"/>
             </a:lnSpc>
@@ -1595,7 +1635,6 @@
             <a:spcAft>
               <a:spcPct val="35000"/>
             </a:spcAft>
-            <a:buNone/>
           </a:pPr>
           <a:r>
             <a:rPr lang="es-MX" sz="1600" kern="1200"/>
@@ -1680,7 +1719,7 @@
         </a:bodyPr>
         <a:lstStyle/>
         <a:p>
-          <a:pPr marL="0" lvl="0" indent="0" algn="l" defTabSz="711200">
+          <a:pPr lvl="0" algn="l" defTabSz="711200">
             <a:lnSpc>
               <a:spcPct val="90000"/>
             </a:lnSpc>
@@ -1690,7 +1729,6 @@
             <a:spcAft>
               <a:spcPct val="35000"/>
             </a:spcAft>
-            <a:buNone/>
           </a:pPr>
           <a:r>
             <a:rPr lang="es-MX" sz="1600" kern="1200" dirty="0"/>
@@ -1730,7 +1768,7 @@
           </a:r>
         </a:p>
         <a:p>
-          <a:pPr marL="0" lvl="0" indent="0" algn="ctr" defTabSz="711200">
+          <a:pPr lvl="0" algn="ctr" defTabSz="711200">
             <a:lnSpc>
               <a:spcPct val="90000"/>
             </a:lnSpc>
@@ -1740,7 +1778,6 @@
             <a:spcAft>
               <a:spcPct val="35000"/>
             </a:spcAft>
-            <a:buNone/>
           </a:pPr>
           <a:r>
             <a:rPr lang="es-MX" sz="1600" kern="1200" dirty="0" err="1"/>
@@ -1761,7 +1798,7 @@
           <a:endParaRPr lang="en-US" sz="1600" kern="1200" dirty="0"/>
         </a:p>
         <a:p>
-          <a:pPr marL="0" lvl="0" indent="0" algn="ctr" defTabSz="711200">
+          <a:pPr lvl="0" algn="ctr" defTabSz="711200">
             <a:lnSpc>
               <a:spcPct val="90000"/>
             </a:lnSpc>
@@ -1771,7 +1808,6 @@
             <a:spcAft>
               <a:spcPct val="35000"/>
             </a:spcAft>
-            <a:buNone/>
           </a:pPr>
           <a:r>
             <a:rPr lang="es-MX" sz="1600" kern="1200" dirty="0" err="1"/>
@@ -1844,7 +1880,7 @@
             <a:spcAft>
               <a:spcPct val="20000"/>
             </a:spcAft>
-            <a:buChar char="•"/>
+            <a:buChar char="••"/>
           </a:pPr>
           <a:endParaRPr lang="en-US" sz="1200" kern="1200" dirty="0"/>
         </a:p>
@@ -3141,7 +3177,7 @@
           <a:p>
             <a:fld id="{FA10851A-3F3E-4165-804F-B667F171FDAA}" type="datetimeFigureOut">
               <a:rPr lang="en-US" smtClean="0"/>
-              <a:t>7/3/2019</a:t>
+              <a:t>7/8/2019</a:t>
             </a:fld>
             <a:endParaRPr lang="en-US"/>
           </a:p>
@@ -3300,7 +3336,7 @@
           <a:p>
             <a:fld id="{FFE43DF2-D420-41A5-9827-8F03A200AA7C}" type="slidenum">
               <a:rPr lang="en-US" smtClean="0"/>
-              <a:t>‹#›</a:t>
+              <a:t>‹Nº›</a:t>
             </a:fld>
             <a:endParaRPr lang="en-US"/>
           </a:p>
@@ -6191,7 +6227,7 @@
           <a:p>
             <a:fld id="{D6FE8693-BDFF-4506-A475-4DDEA5915469}" type="datetimeFigureOut">
               <a:rPr lang="en-US" smtClean="0"/>
-              <a:t>7/3/2019</a:t>
+              <a:t>7/8/2019</a:t>
             </a:fld>
             <a:endParaRPr lang="en-US"/>
           </a:p>
@@ -6233,7 +6269,7 @@
           <a:p>
             <a:fld id="{79983821-169F-493A-A182-E29A068C6D0C}" type="slidenum">
               <a:rPr lang="en-US" smtClean="0"/>
-              <a:t>‹#›</a:t>
+              <a:t>‹Nº›</a:t>
             </a:fld>
             <a:endParaRPr lang="en-US"/>
           </a:p>
@@ -6361,7 +6397,7 @@
           <a:p>
             <a:fld id="{D6FE8693-BDFF-4506-A475-4DDEA5915469}" type="datetimeFigureOut">
               <a:rPr lang="en-US" smtClean="0"/>
-              <a:t>7/3/2019</a:t>
+              <a:t>7/8/2019</a:t>
             </a:fld>
             <a:endParaRPr lang="en-US"/>
           </a:p>
@@ -6403,7 +6439,7 @@
           <a:p>
             <a:fld id="{79983821-169F-493A-A182-E29A068C6D0C}" type="slidenum">
               <a:rPr lang="en-US" smtClean="0"/>
-              <a:t>‹#›</a:t>
+              <a:t>‹Nº›</a:t>
             </a:fld>
             <a:endParaRPr lang="en-US"/>
           </a:p>
@@ -6541,7 +6577,7 @@
           <a:p>
             <a:fld id="{D6FE8693-BDFF-4506-A475-4DDEA5915469}" type="datetimeFigureOut">
               <a:rPr lang="en-US" smtClean="0"/>
-              <a:t>7/3/2019</a:t>
+              <a:t>7/8/2019</a:t>
             </a:fld>
             <a:endParaRPr lang="en-US"/>
           </a:p>
@@ -6583,7 +6619,7 @@
           <a:p>
             <a:fld id="{79983821-169F-493A-A182-E29A068C6D0C}" type="slidenum">
               <a:rPr lang="en-US" smtClean="0"/>
-              <a:t>‹#›</a:t>
+              <a:t>‹Nº›</a:t>
             </a:fld>
             <a:endParaRPr lang="en-US"/>
           </a:p>
@@ -6711,7 +6747,7 @@
           <a:p>
             <a:fld id="{D6FE8693-BDFF-4506-A475-4DDEA5915469}" type="datetimeFigureOut">
               <a:rPr lang="en-US" smtClean="0"/>
-              <a:t>7/3/2019</a:t>
+              <a:t>7/8/2019</a:t>
             </a:fld>
             <a:endParaRPr lang="en-US"/>
           </a:p>
@@ -6753,7 +6789,7 @@
           <a:p>
             <a:fld id="{79983821-169F-493A-A182-E29A068C6D0C}" type="slidenum">
               <a:rPr lang="en-US" smtClean="0"/>
-              <a:t>‹#›</a:t>
+              <a:t>‹Nº›</a:t>
             </a:fld>
             <a:endParaRPr lang="en-US"/>
           </a:p>
@@ -6955,7 +6991,7 @@
           <a:p>
             <a:fld id="{D6FE8693-BDFF-4506-A475-4DDEA5915469}" type="datetimeFigureOut">
               <a:rPr lang="en-US" smtClean="0"/>
-              <a:t>7/3/2019</a:t>
+              <a:t>7/8/2019</a:t>
             </a:fld>
             <a:endParaRPr lang="en-US"/>
           </a:p>
@@ -6997,7 +7033,7 @@
           <a:p>
             <a:fld id="{79983821-169F-493A-A182-E29A068C6D0C}" type="slidenum">
               <a:rPr lang="en-US" smtClean="0"/>
-              <a:t>‹#›</a:t>
+              <a:t>‹Nº›</a:t>
             </a:fld>
             <a:endParaRPr lang="en-US"/>
           </a:p>
@@ -7187,7 +7223,7 @@
           <a:p>
             <a:fld id="{D6FE8693-BDFF-4506-A475-4DDEA5915469}" type="datetimeFigureOut">
               <a:rPr lang="en-US" smtClean="0"/>
-              <a:t>7/3/2019</a:t>
+              <a:t>7/8/2019</a:t>
             </a:fld>
             <a:endParaRPr lang="en-US"/>
           </a:p>
@@ -7229,7 +7265,7 @@
           <a:p>
             <a:fld id="{79983821-169F-493A-A182-E29A068C6D0C}" type="slidenum">
               <a:rPr lang="en-US" smtClean="0"/>
-              <a:t>‹#›</a:t>
+              <a:t>‹Nº›</a:t>
             </a:fld>
             <a:endParaRPr lang="en-US"/>
           </a:p>
@@ -7554,7 +7590,7 @@
           <a:p>
             <a:fld id="{D6FE8693-BDFF-4506-A475-4DDEA5915469}" type="datetimeFigureOut">
               <a:rPr lang="en-US" smtClean="0"/>
-              <a:t>7/3/2019</a:t>
+              <a:t>7/8/2019</a:t>
             </a:fld>
             <a:endParaRPr lang="en-US"/>
           </a:p>
@@ -7596,7 +7632,7 @@
           <a:p>
             <a:fld id="{79983821-169F-493A-A182-E29A068C6D0C}" type="slidenum">
               <a:rPr lang="en-US" smtClean="0"/>
-              <a:t>‹#›</a:t>
+              <a:t>‹Nº›</a:t>
             </a:fld>
             <a:endParaRPr lang="en-US"/>
           </a:p>
@@ -7672,7 +7708,7 @@
           <a:p>
             <a:fld id="{D6FE8693-BDFF-4506-A475-4DDEA5915469}" type="datetimeFigureOut">
               <a:rPr lang="en-US" smtClean="0"/>
-              <a:t>7/3/2019</a:t>
+              <a:t>7/8/2019</a:t>
             </a:fld>
             <a:endParaRPr lang="en-US"/>
           </a:p>
@@ -7714,7 +7750,7 @@
           <a:p>
             <a:fld id="{79983821-169F-493A-A182-E29A068C6D0C}" type="slidenum">
               <a:rPr lang="en-US" smtClean="0"/>
-              <a:t>‹#›</a:t>
+              <a:t>‹Nº›</a:t>
             </a:fld>
             <a:endParaRPr lang="en-US"/>
           </a:p>
@@ -7767,7 +7803,7 @@
           <a:p>
             <a:fld id="{D6FE8693-BDFF-4506-A475-4DDEA5915469}" type="datetimeFigureOut">
               <a:rPr lang="en-US" smtClean="0"/>
-              <a:t>7/3/2019</a:t>
+              <a:t>7/8/2019</a:t>
             </a:fld>
             <a:endParaRPr lang="en-US"/>
           </a:p>
@@ -7809,7 +7845,7 @@
           <a:p>
             <a:fld id="{79983821-169F-493A-A182-E29A068C6D0C}" type="slidenum">
               <a:rPr lang="en-US" smtClean="0"/>
-              <a:t>‹#›</a:t>
+              <a:t>‹Nº›</a:t>
             </a:fld>
             <a:endParaRPr lang="en-US"/>
           </a:p>
@@ -8044,7 +8080,7 @@
           <a:p>
             <a:fld id="{D6FE8693-BDFF-4506-A475-4DDEA5915469}" type="datetimeFigureOut">
               <a:rPr lang="en-US" smtClean="0"/>
-              <a:t>7/3/2019</a:t>
+              <a:t>7/8/2019</a:t>
             </a:fld>
             <a:endParaRPr lang="en-US"/>
           </a:p>
@@ -8086,7 +8122,7 @@
           <a:p>
             <a:fld id="{79983821-169F-493A-A182-E29A068C6D0C}" type="slidenum">
               <a:rPr lang="en-US" smtClean="0"/>
-              <a:t>‹#›</a:t>
+              <a:t>‹Nº›</a:t>
             </a:fld>
             <a:endParaRPr lang="en-US"/>
           </a:p>
@@ -8301,7 +8337,7 @@
           <a:p>
             <a:fld id="{D6FE8693-BDFF-4506-A475-4DDEA5915469}" type="datetimeFigureOut">
               <a:rPr lang="en-US" smtClean="0"/>
-              <a:t>7/3/2019</a:t>
+              <a:t>7/8/2019</a:t>
             </a:fld>
             <a:endParaRPr lang="en-US"/>
           </a:p>
@@ -8343,7 +8379,7 @@
           <a:p>
             <a:fld id="{79983821-169F-493A-A182-E29A068C6D0C}" type="slidenum">
               <a:rPr lang="en-US" smtClean="0"/>
-              <a:t>‹#›</a:t>
+              <a:t>‹Nº›</a:t>
             </a:fld>
             <a:endParaRPr lang="en-US"/>
           </a:p>
@@ -8514,7 +8550,7 @@
           <a:p>
             <a:fld id="{D6FE8693-BDFF-4506-A475-4DDEA5915469}" type="datetimeFigureOut">
               <a:rPr lang="en-US" smtClean="0"/>
-              <a:t>7/3/2019</a:t>
+              <a:t>7/8/2019</a:t>
             </a:fld>
             <a:endParaRPr lang="en-US"/>
           </a:p>
@@ -8592,7 +8628,7 @@
           <a:p>
             <a:fld id="{79983821-169F-493A-A182-E29A068C6D0C}" type="slidenum">
               <a:rPr lang="en-US" smtClean="0"/>
-              <a:t>‹#›</a:t>
+              <a:t>‹Nº›</a:t>
             </a:fld>
             <a:endParaRPr lang="en-US"/>
           </a:p>
@@ -8935,7 +8971,7 @@
                 <a16:creationId xmlns:a16="http://schemas.microsoft.com/office/drawing/2014/main" id="{559AE206-7EBA-4D33-8BC9-9D8158553F0E}"/>
               </a:ext>
               <a:ext uri="{C183D7F6-B498-43B3-948B-1728B52AA6E4}">
-                <adec:decorative xmlns:adec="http://schemas.microsoft.com/office/drawing/2017/decorative" val="1"/>
+                <adec:decorative xmlns:adec="http://schemas.microsoft.com/office/drawing/2017/decorative" xmlns="" val="1"/>
               </a:ext>
             </a:extLst>
           </p:cNvPr>
@@ -9064,7 +9100,7 @@
                 <a16:creationId xmlns:a16="http://schemas.microsoft.com/office/drawing/2014/main" id="{6437D937-A7F1-4011-92B4-328E5BE1B166}"/>
               </a:ext>
               <a:ext uri="{C183D7F6-B498-43B3-948B-1728B52AA6E4}">
-                <adec:decorative xmlns:adec="http://schemas.microsoft.com/office/drawing/2017/decorative" val="1"/>
+                <adec:decorative xmlns:adec="http://schemas.microsoft.com/office/drawing/2017/decorative" xmlns="" val="1"/>
               </a:ext>
             </a:extLst>
           </p:cNvPr>
@@ -9134,7 +9170,7 @@
                 <a16:creationId xmlns:a16="http://schemas.microsoft.com/office/drawing/2014/main" id="{B672F332-AF08-46C6-94F0-77684310D7B7}"/>
               </a:ext>
               <a:ext uri="{C183D7F6-B498-43B3-948B-1728B52AA6E4}">
-                <adec:decorative xmlns:adec="http://schemas.microsoft.com/office/drawing/2017/decorative" val="1"/>
+                <adec:decorative xmlns:adec="http://schemas.microsoft.com/office/drawing/2017/decorative" xmlns="" val="1"/>
               </a:ext>
             </a:extLst>
           </p:cNvPr>
@@ -9204,7 +9240,7 @@
                 <a16:creationId xmlns:a16="http://schemas.microsoft.com/office/drawing/2014/main" id="{34244EF8-D73A-40E1-BE73-D46E6B4B04ED}"/>
               </a:ext>
               <a:ext uri="{C183D7F6-B498-43B3-948B-1728B52AA6E4}">
-                <adec:decorative xmlns:adec="http://schemas.microsoft.com/office/drawing/2017/decorative" val="1"/>
+                <adec:decorative xmlns:adec="http://schemas.microsoft.com/office/drawing/2017/decorative" xmlns="" val="1"/>
               </a:ext>
             </a:extLst>
           </p:cNvPr>
@@ -9274,7 +9310,7 @@
                 <a16:creationId xmlns:a16="http://schemas.microsoft.com/office/drawing/2014/main" id="{AB84D7E8-4ECB-42D7-ADBF-01689B0F24AE}"/>
               </a:ext>
               <a:ext uri="{C183D7F6-B498-43B3-948B-1728B52AA6E4}">
-                <adec:decorative xmlns:adec="http://schemas.microsoft.com/office/drawing/2017/decorative" val="1"/>
+                <adec:decorative xmlns:adec="http://schemas.microsoft.com/office/drawing/2017/decorative" xmlns="" val="1"/>
               </a:ext>
             </a:extLst>
           </p:cNvPr>
@@ -9407,7 +9443,7 @@
                 <a16:creationId xmlns:a16="http://schemas.microsoft.com/office/drawing/2014/main" id="{9E8E38ED-369A-44C2-B635-0BED0E48A6E8}"/>
               </a:ext>
               <a:ext uri="{C183D7F6-B498-43B3-948B-1728B52AA6E4}">
-                <adec:decorative xmlns:adec="http://schemas.microsoft.com/office/drawing/2017/decorative" val="1"/>
+                <adec:decorative xmlns:adec="http://schemas.microsoft.com/office/drawing/2017/decorative" xmlns="" val="1"/>
               </a:ext>
             </a:extLst>
           </p:cNvPr>
@@ -14587,7 +14623,7 @@
                 <a16:creationId xmlns:a16="http://schemas.microsoft.com/office/drawing/2014/main" id="{32BC26D8-82FB-445E-AA49-62A77D7C1EE0}"/>
               </a:ext>
               <a:ext uri="{C183D7F6-B498-43B3-948B-1728B52AA6E4}">
-                <adec:decorative xmlns:adec="http://schemas.microsoft.com/office/drawing/2017/decorative" val="1"/>
+                <adec:decorative xmlns:adec="http://schemas.microsoft.com/office/drawing/2017/decorative" xmlns="" val="1"/>
               </a:ext>
             </a:extLst>
           </p:cNvPr>
@@ -14650,7 +14686,7 @@
                 <a16:creationId xmlns:a16="http://schemas.microsoft.com/office/drawing/2014/main" id="{CB44330D-EA18-4254-AA95-EB49948539B8}"/>
               </a:ext>
               <a:ext uri="{C183D7F6-B498-43B3-948B-1728B52AA6E4}">
-                <adec:decorative xmlns:adec="http://schemas.microsoft.com/office/drawing/2017/decorative" val="1"/>
+                <adec:decorative xmlns:adec="http://schemas.microsoft.com/office/drawing/2017/decorative" xmlns="" val="1"/>
               </a:ext>
             </a:extLst>
           </p:cNvPr>
@@ -15059,12 +15095,40 @@
           <a:lstStyle/>
           <a:p>
             <a:r>
+              <a:rPr lang="es-MX" sz="2400" dirty="0" err="1">
+                <a:solidFill>
+                  <a:srgbClr val="00B050"/>
+                </a:solidFill>
+              </a:rPr>
+              <a:t>Math</a:t>
+            </a:r>
+            <a:r>
               <a:rPr lang="es-MX" sz="2400" dirty="0" err="1"/>
-              <a:t>Math.floor</a:t>
+              <a:t>.</a:t>
+            </a:r>
+            <a:r>
+              <a:rPr lang="es-MX" sz="2400" dirty="0" err="1">
+                <a:solidFill>
+                  <a:srgbClr val="FFC000"/>
+                </a:solidFill>
+              </a:rPr>
+              <a:t>floor</a:t>
             </a:r>
             <a:r>
               <a:rPr lang="es-MX" sz="2400" dirty="0"/>
-              <a:t>(numero) -&gt; </a:t>
+              <a:t>(</a:t>
+            </a:r>
+            <a:r>
+              <a:rPr lang="es-MX" sz="2400" i="1" dirty="0">
+                <a:solidFill>
+                  <a:srgbClr val="00B0F0"/>
+                </a:solidFill>
+              </a:rPr>
+              <a:t>numero</a:t>
+            </a:r>
+            <a:r>
+              <a:rPr lang="es-MX" sz="2400" dirty="0"/>
+              <a:t>) -&gt; </a:t>
             </a:r>
             <a:r>
               <a:rPr lang="es-AR" sz="2400" dirty="0"/>
@@ -15080,28 +15144,92 @@
               <a:buNone/>
             </a:pPr>
             <a:r>
+              <a:rPr lang="es-AR" b="1" dirty="0" err="1">
+                <a:solidFill>
+                  <a:srgbClr val="00B050"/>
+                </a:solidFill>
+              </a:rPr>
+              <a:t>Math</a:t>
+            </a:r>
+            <a:r>
               <a:rPr lang="es-AR" b="1" dirty="0" err="1"/>
-              <a:t>Math.floor</a:t>
+              <a:t>.</a:t>
+            </a:r>
+            <a:r>
+              <a:rPr lang="es-AR" b="1" dirty="0" err="1">
+                <a:solidFill>
+                  <a:srgbClr val="FFC000"/>
+                </a:solidFill>
+              </a:rPr>
+              <a:t>floor</a:t>
             </a:r>
             <a:r>
               <a:rPr lang="es-AR" b="1" dirty="0"/>
               <a:t>(</a:t>
             </a:r>
             <a:r>
+              <a:rPr lang="es-AR" b="1" dirty="0" err="1">
+                <a:solidFill>
+                  <a:srgbClr val="00B050"/>
+                </a:solidFill>
+              </a:rPr>
+              <a:t>Math</a:t>
+            </a:r>
+            <a:r>
               <a:rPr lang="es-AR" b="1" dirty="0" err="1"/>
-              <a:t>Math.random</a:t>
+              <a:t>.</a:t>
+            </a:r>
+            <a:r>
+              <a:rPr lang="es-AR" b="1" dirty="0" err="1">
+                <a:solidFill>
+                  <a:srgbClr val="FFC000"/>
+                </a:solidFill>
+              </a:rPr>
+              <a:t>random</a:t>
             </a:r>
             <a:r>
               <a:rPr lang="es-AR" b="1" dirty="0"/>
               <a:t>() * (</a:t>
             </a:r>
             <a:r>
-              <a:rPr lang="es-AR" b="1" dirty="0" err="1"/>
+              <a:rPr lang="es-AR" b="1" dirty="0" err="1">
+                <a:solidFill>
+                  <a:srgbClr val="FF0000"/>
+                </a:solidFill>
+              </a:rPr>
               <a:t>max</a:t>
             </a:r>
             <a:r>
               <a:rPr lang="es-AR" b="1" dirty="0"/>
-              <a:t> – min + 1) ) + min;</a:t>
+              <a:t> – </a:t>
+            </a:r>
+            <a:r>
+              <a:rPr lang="es-AR" b="1" dirty="0" smtClean="0">
+                <a:solidFill>
+                  <a:srgbClr val="7030A0"/>
+                </a:solidFill>
+              </a:rPr>
+              <a:t>min</a:t>
+            </a:r>
+            <a:r>
+              <a:rPr lang="es-AR" b="1" dirty="0" smtClean="0"/>
+              <a:t>) </a:t>
+            </a:r>
+            <a:r>
+              <a:rPr lang="es-AR" b="1" dirty="0"/>
+              <a:t>) + </a:t>
+            </a:r>
+            <a:r>
+              <a:rPr lang="es-AR" b="1" dirty="0">
+                <a:solidFill>
+                  <a:srgbClr val="7030A0"/>
+                </a:solidFill>
+              </a:rPr>
+              <a:t>min</a:t>
+            </a:r>
+            <a:r>
+              <a:rPr lang="es-AR" b="1" dirty="0" smtClean="0"/>
+              <a:t>;</a:t>
             </a:r>
           </a:p>
           <a:p>
@@ -15115,8 +15243,32 @@
               <a:buNone/>
             </a:pPr>
             <a:r>
+              <a:rPr lang="es-AR" dirty="0" smtClean="0"/>
+              <a:t>-&gt;</a:t>
+            </a:r>
+            <a:r>
+              <a:rPr lang="es-AR" b="1" dirty="0" smtClean="0"/>
+              <a:t> </a:t>
+            </a:r>
+            <a:r>
+              <a:rPr lang="es-AR" dirty="0" smtClean="0"/>
+              <a:t>Devuelve </a:t>
+            </a:r>
+            <a:r>
               <a:rPr lang="es-AR" dirty="0"/>
-              <a:t>Devuelve un numero entero aleatorio entre min (mínimo </a:t>
+              <a:t>un </a:t>
+            </a:r>
+            <a:r>
+              <a:rPr lang="es-AR" dirty="0" smtClean="0"/>
+              <a:t>número </a:t>
+            </a:r>
+            <a:r>
+              <a:rPr lang="es-AR" u="sng" dirty="0"/>
+              <a:t>entero</a:t>
+            </a:r>
+            <a:r>
+              <a:rPr lang="es-AR" dirty="0"/>
+              <a:t> aleatorio entre min (mínimo </a:t>
             </a:r>
             <a:r>
               <a:rPr lang="es-AR" u="sng" dirty="0"/>
@@ -15135,13 +15287,14 @@
               <a:t> (máximo </a:t>
             </a:r>
             <a:r>
-              <a:rPr lang="es-AR" u="sng" dirty="0"/>
-              <a:t>incluido</a:t>
-            </a:r>
-            <a:r>
-              <a:rPr lang="es-AR" dirty="0"/>
+              <a:rPr lang="es-AR" u="sng" dirty="0" smtClean="0"/>
+              <a:t>excluido</a:t>
+            </a:r>
+            <a:r>
+              <a:rPr lang="es-AR" dirty="0" smtClean="0"/>
               <a:t>)</a:t>
             </a:r>
+            <a:endParaRPr lang="es-AR" dirty="0"/>
           </a:p>
           <a:p>
             <a:pPr marL="0" indent="0" algn="ctr">
@@ -15158,29 +15311,122 @@
               <a:t>Ej. </a:t>
             </a:r>
             <a:r>
+              <a:rPr lang="es-AR" dirty="0" err="1">
+                <a:solidFill>
+                  <a:srgbClr val="00B050"/>
+                </a:solidFill>
+              </a:rPr>
+              <a:t>Math</a:t>
+            </a:r>
+            <a:r>
               <a:rPr lang="es-AR" dirty="0" err="1"/>
-              <a:t>Math.floor</a:t>
+              <a:t>.</a:t>
+            </a:r>
+            <a:r>
+              <a:rPr lang="es-AR" dirty="0" err="1">
+                <a:solidFill>
+                  <a:srgbClr val="FFC000"/>
+                </a:solidFill>
+              </a:rPr>
+              <a:t>floor</a:t>
             </a:r>
             <a:r>
               <a:rPr lang="es-AR" dirty="0"/>
               <a:t>(</a:t>
             </a:r>
             <a:r>
+              <a:rPr lang="es-AR" dirty="0" err="1">
+                <a:solidFill>
+                  <a:srgbClr val="00B050"/>
+                </a:solidFill>
+              </a:rPr>
+              <a:t>Math</a:t>
+            </a:r>
+            <a:r>
               <a:rPr lang="es-AR" dirty="0" err="1"/>
-              <a:t>Math.random</a:t>
+              <a:t>.</a:t>
+            </a:r>
+            <a:r>
+              <a:rPr lang="es-AR" dirty="0" err="1">
+                <a:solidFill>
+                  <a:srgbClr val="FFC000"/>
+                </a:solidFill>
+              </a:rPr>
+              <a:t>random</a:t>
             </a:r>
             <a:r>
               <a:rPr lang="es-AR" dirty="0"/>
-              <a:t>() * (100 – 9 + 1) ) + 9;</a:t>
-            </a:r>
+              <a:t>() * </a:t>
+            </a:r>
+            <a:r>
+              <a:rPr lang="es-AR" dirty="0" smtClean="0"/>
+              <a:t>(</a:t>
+            </a:r>
+            <a:r>
+              <a:rPr lang="es-AR" dirty="0" smtClean="0">
+                <a:solidFill>
+                  <a:srgbClr val="FF0000"/>
+                </a:solidFill>
+              </a:rPr>
+              <a:t>101</a:t>
+            </a:r>
+            <a:r>
+              <a:rPr lang="es-AR" dirty="0" smtClean="0"/>
+              <a:t> </a:t>
+            </a:r>
+            <a:r>
+              <a:rPr lang="es-AR" dirty="0"/>
+              <a:t>– </a:t>
+            </a:r>
+            <a:r>
+              <a:rPr lang="es-AR" dirty="0" smtClean="0">
+                <a:solidFill>
+                  <a:srgbClr val="7030A0"/>
+                </a:solidFill>
+              </a:rPr>
+              <a:t>9</a:t>
+            </a:r>
+            <a:r>
+              <a:rPr lang="es-AR" dirty="0" smtClean="0"/>
+              <a:t>) </a:t>
+            </a:r>
+            <a:r>
+              <a:rPr lang="es-AR" dirty="0"/>
+              <a:t>) + </a:t>
+            </a:r>
+            <a:r>
+              <a:rPr lang="es-AR" dirty="0" smtClean="0">
+                <a:solidFill>
+                  <a:srgbClr val="7030A0"/>
+                </a:solidFill>
+              </a:rPr>
+              <a:t>9</a:t>
+            </a:r>
+            <a:r>
+              <a:rPr lang="es-AR" dirty="0" smtClean="0"/>
+              <a:t>;</a:t>
+            </a:r>
+            <a:endParaRPr lang="es-AR" dirty="0"/>
           </a:p>
           <a:p>
             <a:pPr marL="0" indent="0" algn="ctr">
               <a:buNone/>
             </a:pPr>
             <a:r>
+              <a:rPr lang="es-MX" dirty="0" smtClean="0"/>
+              <a:t>-&gt; Retorna </a:t>
+            </a:r>
+            <a:r>
               <a:rPr lang="es-MX" dirty="0"/>
-              <a:t>Retorna un entero aleatorio entre 9 y 100 incluidos.</a:t>
+              <a:t>un entero aleatorio entre 9 y 100 </a:t>
+            </a:r>
+            <a:r>
+              <a:rPr lang="es-MX" u="sng" dirty="0"/>
+              <a:t>incluidos</a:t>
+            </a:r>
+            <a:r>
+              <a:rPr lang="es-MX" dirty="0"/>
+              <a:t>.</a:t>
             </a:r>
           </a:p>
         </p:txBody>
@@ -15277,14 +15523,14 @@
             <a:pPr marL="0" indent="0">
               <a:buNone/>
             </a:pPr>
-            <a:endParaRPr lang="es-MX" sz="2400" dirty="0"/>
+            <a:endParaRPr lang="es-MX" sz="1050" dirty="0"/>
           </a:p>
           <a:p>
             <a:pPr marL="0" indent="0" algn="ctr">
               <a:buNone/>
             </a:pPr>
             <a:r>
-              <a:rPr lang="es-MX" sz="3600" b="1" dirty="0"/>
+              <a:rPr lang="es-MX" sz="4400" b="1" dirty="0"/>
               <a:t>! (P &amp;&amp; Q) ↔ (!P) || (!Q)</a:t>
             </a:r>
           </a:p>
@@ -15293,7 +15539,7 @@
               <a:buNone/>
             </a:pPr>
             <a:r>
-              <a:rPr lang="es-MX" sz="3600" b="1" dirty="0"/>
+              <a:rPr lang="es-MX" sz="4400" b="1" dirty="0"/>
               <a:t>! (P || Q) ↔ (!P) &amp;&amp; (!Q)</a:t>
             </a:r>
           </a:p>
@@ -15307,16 +15553,15 @@
           </p:cNvPicPr>
           <p:nvPr/>
         </p:nvPicPr>
-        <p:blipFill>
+        <p:blipFill rotWithShape="1">
           <a:blip r:embed="rId3"/>
-          <a:stretch>
-            <a:fillRect/>
-          </a:stretch>
+          <a:srcRect l="-221" t="-365" r="7295" b="365"/>
+          <a:stretch/>
         </p:blipFill>
         <p:spPr>
           <a:xfrm>
-            <a:off x="0" y="3771093"/>
-            <a:ext cx="4602997" cy="2784690"/>
+            <a:off x="1" y="3771093"/>
+            <a:ext cx="4277360" cy="2784690"/>
           </a:xfrm>
           <a:prstGeom prst="rect">
             <a:avLst/>
@@ -15339,8 +15584,8 @@
         </p:blipFill>
         <p:spPr>
           <a:xfrm>
-            <a:off x="4602997" y="3771093"/>
-            <a:ext cx="4541003" cy="2784690"/>
+            <a:off x="4389120" y="3771093"/>
+            <a:ext cx="4754880" cy="2784690"/>
           </a:xfrm>
           <a:prstGeom prst="rect">
             <a:avLst/>
@@ -15677,7 +15922,7 @@
                 <a16:creationId xmlns:a16="http://schemas.microsoft.com/office/drawing/2014/main" id="{A4AC5506-6312-4701-8D3C-40187889A947}"/>
               </a:ext>
               <a:ext uri="{C183D7F6-B498-43B3-948B-1728B52AA6E4}">
-                <adec:decorative xmlns:adec="http://schemas.microsoft.com/office/drawing/2017/decorative" val="1"/>
+                <adec:decorative xmlns:adec="http://schemas.microsoft.com/office/drawing/2017/decorative" xmlns="" val="1"/>
               </a:ext>
             </a:extLst>
           </p:cNvPr>
@@ -16924,7 +17169,7 @@
                 <a16:creationId xmlns:a16="http://schemas.microsoft.com/office/drawing/2014/main" id="{81AEB8A9-B768-4E30-BA55-D919E6687343}"/>
               </a:ext>
               <a:ext uri="{C183D7F6-B498-43B3-948B-1728B52AA6E4}">
-                <adec:decorative xmlns:adec="http://schemas.microsoft.com/office/drawing/2017/decorative" val="1"/>
+                <adec:decorative xmlns:adec="http://schemas.microsoft.com/office/drawing/2017/decorative" xmlns="" val="1"/>
               </a:ext>
             </a:extLst>
           </p:cNvPr>
@@ -17222,7 +17467,7 @@
                 <a16:creationId xmlns:a16="http://schemas.microsoft.com/office/drawing/2014/main" id="{8D70B121-56F4-4848-B38B-182089D909FA}"/>
               </a:ext>
               <a:ext uri="{C183D7F6-B498-43B3-948B-1728B52AA6E4}">
-                <adec:decorative xmlns:adec="http://schemas.microsoft.com/office/drawing/2017/decorative" val="1"/>
+                <adec:decorative xmlns:adec="http://schemas.microsoft.com/office/drawing/2017/decorative" xmlns="" val="1"/>
               </a:ext>
             </a:extLst>
           </p:cNvPr>
@@ -17326,7 +17571,7 @@
                 <a16:creationId xmlns:a16="http://schemas.microsoft.com/office/drawing/2014/main" id="{2D72A2C9-F3CA-4216-8BAD-FA4C970C3C4E}"/>
               </a:ext>
               <a:ext uri="{C183D7F6-B498-43B3-948B-1728B52AA6E4}">
-                <adec:decorative xmlns:adec="http://schemas.microsoft.com/office/drawing/2017/decorative" val="1"/>
+                <adec:decorative xmlns:adec="http://schemas.microsoft.com/office/drawing/2017/decorative" xmlns="" val="1"/>
               </a:ext>
             </a:extLst>
           </p:cNvPr>
@@ -18243,7 +18488,7 @@
                 <a16:creationId xmlns:a16="http://schemas.microsoft.com/office/drawing/2014/main" id="{46C2E80F-49A6-4372-B103-219D417A55ED}"/>
               </a:ext>
               <a:ext uri="{C183D7F6-B498-43B3-948B-1728B52AA6E4}">
-                <adec:decorative xmlns:adec="http://schemas.microsoft.com/office/drawing/2017/decorative" val="1"/>
+                <adec:decorative xmlns:adec="http://schemas.microsoft.com/office/drawing/2017/decorative" xmlns="" val="1"/>
               </a:ext>
             </a:extLst>
           </p:cNvPr>

</xml_diff>